<commit_message>
update slides for task3
</commit_message>
<xml_diff>
--- a/Practice Tasks/Task_3/Task 3.pptx
+++ b/Practice Tasks/Task_3/Task 3.pptx
@@ -5,14 +5,16 @@
     <p:sldMasterId id="2147483659" r:id="rId1"/>
   </p:sldMasterIdLst>
   <p:notesMasterIdLst>
-    <p:notesMasterId r:id="rId7"/>
+    <p:notesMasterId r:id="rId9"/>
   </p:notesMasterIdLst>
   <p:sldIdLst>
     <p:sldId id="263" r:id="rId2"/>
     <p:sldId id="257" r:id="rId3"/>
     <p:sldId id="258" r:id="rId4"/>
-    <p:sldId id="261" r:id="rId5"/>
-    <p:sldId id="262" r:id="rId6"/>
+    <p:sldId id="264" r:id="rId5"/>
+    <p:sldId id="265" r:id="rId6"/>
+    <p:sldId id="261" r:id="rId7"/>
+    <p:sldId id="262" r:id="rId8"/>
   </p:sldIdLst>
   <p:sldSz cx="9144000" cy="5143500" type="screen16x9"/>
   <p:notesSz cx="6858000" cy="9144000"/>
@@ -5519,8 +5521,47 @@
           <a:lstStyle/>
           <a:p>
             <a:r>
+              <a:rPr lang="en-US" b="1" i="0" dirty="0">
+                <a:solidFill>
+                  <a:srgbClr val="1F2328"/>
+                </a:solidFill>
+                <a:effectLst/>
+                <a:latin typeface="-apple-system"/>
+              </a:rPr>
+              <a:t>Kubernetes </a:t>
+            </a:r>
+            <a:r>
+              <a:rPr lang="en-US" b="1" i="0" dirty="0" err="1">
+                <a:solidFill>
+                  <a:srgbClr val="1F2328"/>
+                </a:solidFill>
+                <a:effectLst/>
+                <a:latin typeface="-apple-system"/>
+              </a:rPr>
+              <a:t>Empowerer</a:t>
+            </a:r>
+            <a:r>
+              <a:rPr lang="en-US" b="1" i="0" dirty="0">
+                <a:solidFill>
+                  <a:srgbClr val="1F2328"/>
+                </a:solidFill>
+                <a:effectLst/>
+                <a:latin typeface="-apple-system"/>
+              </a:rPr>
+              <a:t> via API</a:t>
+            </a:r>
+            <a:br>
+              <a:rPr lang="en-US" b="1" i="0" dirty="0">
+                <a:solidFill>
+                  <a:srgbClr val="1F2328"/>
+                </a:solidFill>
+                <a:effectLst/>
+                <a:latin typeface="-apple-system"/>
+              </a:rPr>
+            </a:br>
+            <a:r>
               <a:rPr lang="en-US" dirty="0"/>
-              <a:t>Kubernetes Extender to API Gateway (KEA)</a:t>
+              <a:t>(KEA)</a:t>
             </a:r>
             <a:endParaRPr lang="ru-RU" dirty="0"/>
           </a:p>
@@ -5682,234 +5723,18 @@
               <a:buNone/>
             </a:pPr>
             <a:r>
-              <a:rPr lang="en-GB" sz="1400" dirty="0">
+              <a:rPr lang="en-US" sz="1400" dirty="0">
                 <a:solidFill>
                   <a:schemeClr val="dk1"/>
                 </a:solidFill>
               </a:rPr>
-              <a:t>Product provides extension of the existing ingress implementation in Kubernetes</a:t>
+              <a:t>The product is a platform for deploying, managing, and scaling machine learning models in a production environment. It's primary purpose is to provide a flexible and secure environment for automating ML processes, including model versioning, request routing, and monitoring. The system integrates with Kubernetes, supports model containerization. The product is designed for developers, ML engineers, DevOps teams, and enterprises that require a stable, scalable, and resilient infrastructure for their ML projects.</a:t>
             </a:r>
-            <a:r>
-              <a:rPr lang="ru-RU" sz="1400" dirty="0">
-                <a:solidFill>
-                  <a:schemeClr val="dk1"/>
-                </a:solidFill>
-              </a:rPr>
-              <a:t> </a:t>
-            </a:r>
-            <a:r>
-              <a:rPr lang="en-US" sz="1400" dirty="0">
-                <a:solidFill>
-                  <a:schemeClr val="dk1"/>
-                </a:solidFill>
-              </a:rPr>
-              <a:t>using</a:t>
-            </a:r>
-            <a:r>
-              <a:rPr lang="en-GB" sz="1400" dirty="0">
-                <a:solidFill>
-                  <a:schemeClr val="dk1"/>
-                </a:solidFill>
-              </a:rPr>
-              <a:t> Custom Resource Definitions (CRDs) and automatic generation of the </a:t>
-            </a:r>
-            <a:r>
-              <a:rPr lang="en-GB" sz="1400" dirty="0" err="1">
-                <a:solidFill>
-                  <a:schemeClr val="dk1"/>
-                </a:solidFill>
-              </a:rPr>
-              <a:t>OpenAPI</a:t>
-            </a:r>
-            <a:r>
-              <a:rPr lang="en-GB" sz="1400" dirty="0">
-                <a:solidFill>
-                  <a:schemeClr val="dk1"/>
-                </a:solidFill>
-              </a:rPr>
-              <a:t> scheme from source code.</a:t>
-            </a:r>
           </a:p>
           <a:p>
             <a:pPr marL="0" lvl="0" indent="0" algn="l" rtl="0">
               <a:spcBef>
                 <a:spcPts val="0"/>
-              </a:spcBef>
-              <a:spcAft>
-                <a:spcPts val="0"/>
-              </a:spcAft>
-              <a:buNone/>
-            </a:pPr>
-            <a:r>
-              <a:rPr lang="en-GB" sz="1400" dirty="0">
-                <a:solidFill>
-                  <a:schemeClr val="dk1"/>
-                </a:solidFill>
-              </a:rPr>
-              <a:t>The main features are:</a:t>
-            </a:r>
-            <a:endParaRPr sz="1400" dirty="0">
-              <a:solidFill>
-                <a:schemeClr val="dk1"/>
-              </a:solidFill>
-            </a:endParaRPr>
-          </a:p>
-          <a:p>
-            <a:pPr marL="457200" lvl="0" indent="-317500" algn="l" rtl="0">
-              <a:spcBef>
-                <a:spcPts val="1200"/>
-              </a:spcBef>
-              <a:spcAft>
-                <a:spcPts val="0"/>
-              </a:spcAft>
-              <a:buClr>
-                <a:schemeClr val="dk1"/>
-              </a:buClr>
-              <a:buSzPts val="1400"/>
-              <a:buChar char="-"/>
-            </a:pPr>
-            <a:r>
-              <a:rPr lang="en-GB" sz="1400" dirty="0">
-                <a:solidFill>
-                  <a:schemeClr val="dk1"/>
-                </a:solidFill>
-              </a:rPr>
-              <a:t>Single Sign-On</a:t>
-            </a:r>
-            <a:endParaRPr sz="1400" dirty="0">
-              <a:solidFill>
-                <a:schemeClr val="dk1"/>
-              </a:solidFill>
-            </a:endParaRPr>
-          </a:p>
-          <a:p>
-            <a:pPr marL="457200" lvl="0" indent="-317500" algn="l" rtl="0">
-              <a:spcBef>
-                <a:spcPts val="0"/>
-              </a:spcBef>
-              <a:spcAft>
-                <a:spcPts val="0"/>
-              </a:spcAft>
-              <a:buClr>
-                <a:schemeClr val="dk1"/>
-              </a:buClr>
-              <a:buSzPts val="1400"/>
-              <a:buChar char="-"/>
-            </a:pPr>
-            <a:r>
-              <a:rPr lang="en-GB" sz="1400" dirty="0">
-                <a:solidFill>
-                  <a:srgbClr val="1F2328"/>
-                </a:solidFill>
-                <a:highlight>
-                  <a:srgbClr val="FFFFFF"/>
-                </a:highlight>
-              </a:rPr>
-              <a:t>Automatic </a:t>
-            </a:r>
-            <a:r>
-              <a:rPr lang="en-GB" sz="1400" dirty="0" err="1">
-                <a:solidFill>
-                  <a:srgbClr val="1F2328"/>
-                </a:solidFill>
-                <a:highlight>
-                  <a:srgbClr val="FFFFFF"/>
-                </a:highlight>
-              </a:rPr>
-              <a:t>OpenAPI</a:t>
-            </a:r>
-            <a:r>
-              <a:rPr lang="en-GB" sz="1400" dirty="0">
-                <a:solidFill>
-                  <a:srgbClr val="1F2328"/>
-                </a:solidFill>
-                <a:highlight>
-                  <a:srgbClr val="FFFFFF"/>
-                </a:highlight>
-              </a:rPr>
-              <a:t> scheme generation</a:t>
-            </a:r>
-            <a:endParaRPr sz="1400" dirty="0">
-              <a:solidFill>
-                <a:srgbClr val="1F2328"/>
-              </a:solidFill>
-              <a:highlight>
-                <a:srgbClr val="FFFFFF"/>
-              </a:highlight>
-            </a:endParaRPr>
-          </a:p>
-          <a:p>
-            <a:pPr marL="457200" lvl="0" indent="-317500" algn="l" rtl="0">
-              <a:spcBef>
-                <a:spcPts val="0"/>
-              </a:spcBef>
-              <a:spcAft>
-                <a:spcPts val="0"/>
-              </a:spcAft>
-              <a:buClr>
-                <a:srgbClr val="1F2328"/>
-              </a:buClr>
-              <a:buSzPts val="1400"/>
-              <a:buChar char="-"/>
-            </a:pPr>
-            <a:r>
-              <a:rPr lang="en-GB" sz="1400" dirty="0">
-                <a:solidFill>
-                  <a:srgbClr val="1F2328"/>
-                </a:solidFill>
-                <a:highlight>
-                  <a:srgbClr val="FFFFFF"/>
-                </a:highlight>
-              </a:rPr>
-              <a:t>Request validation</a:t>
-            </a:r>
-            <a:endParaRPr sz="1400" dirty="0">
-              <a:solidFill>
-                <a:srgbClr val="1F2328"/>
-              </a:solidFill>
-              <a:highlight>
-                <a:srgbClr val="FFFFFF"/>
-              </a:highlight>
-            </a:endParaRPr>
-          </a:p>
-          <a:p>
-            <a:pPr marL="457200" lvl="0" indent="-317500" algn="l" rtl="0">
-              <a:spcBef>
-                <a:spcPts val="0"/>
-              </a:spcBef>
-              <a:spcAft>
-                <a:spcPts val="0"/>
-              </a:spcAft>
-              <a:buClr>
-                <a:srgbClr val="1F2328"/>
-              </a:buClr>
-              <a:buSzPts val="1400"/>
-              <a:buChar char="-"/>
-            </a:pPr>
-            <a:r>
-              <a:rPr lang="en-GB" sz="1400" dirty="0">
-                <a:solidFill>
-                  <a:srgbClr val="1F2328"/>
-                </a:solidFill>
-                <a:highlight>
-                  <a:srgbClr val="FFFFFF"/>
-                </a:highlight>
-              </a:rPr>
-              <a:t>Response caching</a:t>
-            </a:r>
-            <a:endParaRPr sz="1400" dirty="0">
-              <a:solidFill>
-                <a:srgbClr val="1F2328"/>
-              </a:solidFill>
-              <a:highlight>
-                <a:srgbClr val="FFFFFF"/>
-              </a:highlight>
-            </a:endParaRPr>
-          </a:p>
-          <a:p>
-            <a:pPr marL="0" lvl="0" indent="0" algn="l" rtl="0">
-              <a:spcBef>
-                <a:spcPts val="1200"/>
               </a:spcBef>
               <a:spcAft>
                 <a:spcPts val="0"/>
@@ -5933,20 +5758,12 @@
               <a:buNone/>
             </a:pPr>
             <a:r>
-              <a:rPr lang="en-GB" sz="1400">
+              <a:rPr lang="en-GB" sz="1400" dirty="0">
                 <a:solidFill>
                   <a:schemeClr val="dk1"/>
                 </a:solidFill>
               </a:rPr>
-              <a:t>Team K8C: </a:t>
-            </a:r>
-            <a:r>
-              <a:rPr lang="en-GB" sz="1400" dirty="0">
-                <a:solidFill>
-                  <a:schemeClr val="dk1"/>
-                </a:solidFill>
-              </a:rPr>
-              <a:t>Daniel </a:t>
+              <a:t>Team K8C: Daniel </a:t>
             </a:r>
             <a:r>
               <a:rPr lang="en-GB" sz="1400" dirty="0" err="1">
@@ -6170,8 +5987,8 @@
         </p:nvSpPr>
         <p:spPr>
           <a:xfrm>
-            <a:off x="517711" y="2591660"/>
-            <a:ext cx="3543301" cy="1711399"/>
+            <a:off x="4867836" y="1277470"/>
+            <a:ext cx="3939988" cy="3012142"/>
           </a:xfrm>
           <a:prstGeom prst="rect">
             <a:avLst/>
@@ -6193,23 +6010,34 @@
               <a:buNone/>
             </a:pPr>
             <a:r>
-              <a:rPr lang="en-GB" sz="1200" b="1" dirty="0">
-                <a:solidFill>
-                  <a:schemeClr val="dk1"/>
+              <a:rPr lang="en-US" b="1" dirty="0">
+                <a:solidFill>
+                  <a:schemeClr val="tx1"/>
                 </a:solidFill>
               </a:rPr>
-              <a:t>DevOps</a:t>
+              <a:t>API Consumer</a:t>
             </a:r>
-            <a:endParaRPr sz="1200" dirty="0">
+          </a:p>
+          <a:p>
+            <a:pPr marL="0" lvl="0" indent="0" algn="just" rtl="0">
+              <a:spcBef>
+                <a:spcPts val="0"/>
+              </a:spcBef>
+              <a:spcAft>
+                <a:spcPts val="0"/>
+              </a:spcAft>
+              <a:buNone/>
+            </a:pPr>
+            <a:endParaRPr lang="en-US" b="1" dirty="0">
               <a:solidFill>
-                <a:schemeClr val="dk1"/>
+                <a:schemeClr val="tx1"/>
               </a:solidFill>
             </a:endParaRPr>
           </a:p>
           <a:p>
             <a:pPr marL="0" lvl="0" indent="0" algn="just" rtl="0">
               <a:spcBef>
-                <a:spcPts val="1200"/>
+                <a:spcPts val="0"/>
               </a:spcBef>
               <a:spcAft>
                 <a:spcPts val="0"/>
@@ -6217,16 +6045,24 @@
               <a:buNone/>
             </a:pPr>
             <a:r>
-              <a:rPr lang="en-GB" sz="1200" dirty="0">
-                <a:solidFill>
-                  <a:schemeClr val="dk1"/>
+              <a:rPr lang="en-US" b="1" dirty="0">
+                <a:solidFill>
+                  <a:schemeClr val="tx1"/>
                 </a:solidFill>
               </a:rPr>
-              <a:t>Described products will benefit mostly for DevOps role. That role assume handling and managing Kubernetes cluster. They will have to configure particular .</a:t>
+              <a:t>Description:</a:t>
             </a:r>
-            <a:endParaRPr sz="1200" dirty="0">
+            <a:r>
+              <a:rPr lang="en-US" dirty="0">
+                <a:solidFill>
+                  <a:schemeClr val="tx1"/>
+                </a:solidFill>
+              </a:rPr>
+              <a:t> This role includes all users interacting with APIs to integrate ML models into their applications. They want to access reliable and well-documented APIs, enabling seamless integration of ML models into their business applications and ensuring optimal performance and usability.</a:t>
+            </a:r>
+            <a:endParaRPr dirty="0">
               <a:solidFill>
-                <a:schemeClr val="dk1"/>
+                <a:schemeClr val="tx1"/>
               </a:solidFill>
             </a:endParaRPr>
           </a:p>
@@ -6244,8 +6080,8 @@
         </p:nvSpPr>
         <p:spPr>
           <a:xfrm>
-            <a:off x="5377184" y="2613247"/>
-            <a:ext cx="2987100" cy="2090700"/>
+            <a:off x="336176" y="1277470"/>
+            <a:ext cx="4034118" cy="3160059"/>
           </a:xfrm>
           <a:prstGeom prst="rect">
             <a:avLst/>
@@ -6257,131 +6093,53 @@
           </a:bodyPr>
           <a:lstStyle/>
           <a:p>
-            <a:pPr marL="0" lvl="0" indent="0" algn="just" rtl="0">
-              <a:spcBef>
-                <a:spcPts val="0"/>
-              </a:spcBef>
-              <a:spcAft>
-                <a:spcPts val="0"/>
-              </a:spcAft>
+            <a:pPr marL="139700" indent="0">
               <a:buNone/>
             </a:pPr>
             <a:r>
-              <a:rPr lang="en-GB" sz="1200" b="1" dirty="0">
-                <a:solidFill>
-                  <a:schemeClr val="dk1"/>
+              <a:rPr lang="en-US" b="1" dirty="0">
+                <a:solidFill>
+                  <a:schemeClr val="tx1"/>
                 </a:solidFill>
               </a:rPr>
-              <a:t>Developer</a:t>
+              <a:t>ML Engineer</a:t>
             </a:r>
-            <a:endParaRPr sz="1200" dirty="0">
+            <a:endParaRPr lang="ru-RU" b="1" dirty="0">
               <a:solidFill>
-                <a:schemeClr val="dk1"/>
+                <a:schemeClr val="tx1"/>
               </a:solidFill>
             </a:endParaRPr>
           </a:p>
           <a:p>
-            <a:pPr marL="0" lvl="0" indent="0" algn="just" rtl="0">
-              <a:spcBef>
-                <a:spcPts val="1200"/>
-              </a:spcBef>
-              <a:spcAft>
-                <a:spcPts val="0"/>
-              </a:spcAft>
+            <a:pPr marL="139700" indent="0">
               <a:buNone/>
             </a:pPr>
+            <a:br>
+              <a:rPr lang="en-US" dirty="0">
+                <a:solidFill>
+                  <a:schemeClr val="tx1"/>
+                </a:solidFill>
+              </a:rPr>
+            </a:br>
             <a:r>
-              <a:rPr lang="en-GB" sz="1200" dirty="0">
-                <a:solidFill>
-                  <a:schemeClr val="dk1"/>
+              <a:rPr lang="en-US" b="1" dirty="0">
+                <a:solidFill>
+                  <a:schemeClr val="tx1"/>
                 </a:solidFill>
               </a:rPr>
-              <a:t>Developer will access API Gateway and </a:t>
+              <a:t>Description:</a:t>
             </a:r>
             <a:r>
-              <a:rPr lang="en-GB" sz="1200" dirty="0" err="1">
-                <a:solidFill>
-                  <a:schemeClr val="dk1"/>
+              <a:rPr lang="en-US" dirty="0">
+                <a:solidFill>
+                  <a:schemeClr val="tx1"/>
                 </a:solidFill>
               </a:rPr>
-              <a:t>OpenAPI</a:t>
+              <a:t> This role joins professionals involved in the development, deployment, and monitoring of ML models. They want to simplify the deployment process, automate API documentation, and ensure efficient request validation and caching, ultimately enhancing their workflow and model performance.</a:t>
             </a:r>
-            <a:r>
-              <a:rPr lang="en-GB" sz="1200" dirty="0">
-                <a:solidFill>
-                  <a:schemeClr val="dk1"/>
-                </a:solidFill>
-              </a:rPr>
-              <a:t> scheme to develop and integrate new features into existing.</a:t>
-            </a:r>
-            <a:endParaRPr sz="1200" dirty="0">
-              <a:solidFill>
-                <a:schemeClr val="dk1"/>
-              </a:solidFill>
-            </a:endParaRPr>
           </a:p>
         </p:txBody>
       </p:sp>
-      <p:pic>
-        <p:nvPicPr>
-          <p:cNvPr id="3" name="Рисунок 2">
-            <a:extLst>
-              <a:ext uri="{FF2B5EF4-FFF2-40B4-BE49-F238E27FC236}">
-                <a16:creationId xmlns:a16="http://schemas.microsoft.com/office/drawing/2014/main" id="{C247CF87-BF62-4A6C-93E5-F781FC27D549}"/>
-              </a:ext>
-            </a:extLst>
-          </p:cNvPr>
-          <p:cNvPicPr>
-            <a:picLocks noChangeAspect="1"/>
-          </p:cNvPicPr>
-          <p:nvPr/>
-        </p:nvPicPr>
-        <p:blipFill>
-          <a:blip r:embed="rId3"/>
-          <a:stretch>
-            <a:fillRect/>
-          </a:stretch>
-        </p:blipFill>
-        <p:spPr>
-          <a:xfrm>
-            <a:off x="1133725" y="903669"/>
-            <a:ext cx="1440000" cy="1440000"/>
-          </a:xfrm>
-          <a:prstGeom prst="rect">
-            <a:avLst/>
-          </a:prstGeom>
-        </p:spPr>
-      </p:pic>
-      <p:pic>
-        <p:nvPicPr>
-          <p:cNvPr id="5" name="Рисунок 4">
-            <a:extLst>
-              <a:ext uri="{FF2B5EF4-FFF2-40B4-BE49-F238E27FC236}">
-                <a16:creationId xmlns:a16="http://schemas.microsoft.com/office/drawing/2014/main" id="{C45EACC6-CC25-489C-9625-7D14D0904789}"/>
-              </a:ext>
-            </a:extLst>
-          </p:cNvPr>
-          <p:cNvPicPr>
-            <a:picLocks noChangeAspect="1"/>
-          </p:cNvPicPr>
-          <p:nvPr/>
-        </p:nvPicPr>
-        <p:blipFill>
-          <a:blip r:embed="rId4"/>
-          <a:stretch>
-            <a:fillRect/>
-          </a:stretch>
-        </p:blipFill>
-        <p:spPr>
-          <a:xfrm>
-            <a:off x="5850277" y="903669"/>
-            <a:ext cx="1440000" cy="1440000"/>
-          </a:xfrm>
-          <a:prstGeom prst="rect">
-            <a:avLst/>
-          </a:prstGeom>
-        </p:spPr>
-      </p:pic>
     </p:spTree>
   </p:cSld>
   <p:clrMapOvr>
@@ -6391,6 +6149,1283 @@
 </file>
 
 <file path=ppt/slides/slide4.xml><?xml version="1.0" encoding="utf-8"?>
+<p:sld xmlns:a="http://schemas.openxmlformats.org/drawingml/2006/main" xmlns:r="http://schemas.openxmlformats.org/officeDocument/2006/relationships" xmlns:p="http://schemas.openxmlformats.org/presentationml/2006/main">
+  <p:cSld>
+    <p:spTree>
+      <p:nvGrpSpPr>
+        <p:cNvPr id="1" name=""/>
+        <p:cNvGrpSpPr/>
+        <p:nvPr/>
+      </p:nvGrpSpPr>
+      <p:grpSpPr>
+        <a:xfrm>
+          <a:off x="0" y="0"/>
+          <a:ext cx="0" cy="0"/>
+          <a:chOff x="0" y="0"/>
+          <a:chExt cx="0" cy="0"/>
+        </a:xfrm>
+      </p:grpSpPr>
+      <p:sp>
+        <p:nvSpPr>
+          <p:cNvPr id="3" name="Текст 2">
+            <a:extLst>
+              <a:ext uri="{FF2B5EF4-FFF2-40B4-BE49-F238E27FC236}">
+                <a16:creationId xmlns:a16="http://schemas.microsoft.com/office/drawing/2014/main" id="{73D9E495-74CF-49FC-8FE9-9E20997A0616}"/>
+              </a:ext>
+            </a:extLst>
+          </p:cNvPr>
+          <p:cNvSpPr>
+            <a:spLocks noGrp="1"/>
+          </p:cNvSpPr>
+          <p:nvPr>
+            <p:ph type="body" idx="1"/>
+          </p:nvPr>
+        </p:nvSpPr>
+        <p:spPr>
+          <a:xfrm>
+            <a:off x="311701" y="863550"/>
+            <a:ext cx="4051870" cy="3416400"/>
+          </a:xfrm>
+        </p:spPr>
+        <p:txBody>
+          <a:bodyPr/>
+          <a:lstStyle/>
+          <a:p>
+            <a:pPr marL="139700" indent="0">
+              <a:buNone/>
+            </a:pPr>
+            <a:r>
+              <a:rPr lang="en-US" b="1" dirty="0">
+                <a:solidFill>
+                  <a:schemeClr val="tx1"/>
+                </a:solidFill>
+              </a:rPr>
+              <a:t>ML Engineer (Maria, 32 years old)</a:t>
+            </a:r>
+          </a:p>
+          <a:p>
+            <a:pPr marL="139700" indent="0">
+              <a:buNone/>
+            </a:pPr>
+            <a:br>
+              <a:rPr lang="en-US" dirty="0">
+                <a:solidFill>
+                  <a:schemeClr val="tx1"/>
+                </a:solidFill>
+              </a:rPr>
+            </a:br>
+            <a:r>
+              <a:rPr lang="en-US" b="1" dirty="0">
+                <a:solidFill>
+                  <a:schemeClr val="tx1"/>
+                </a:solidFill>
+              </a:rPr>
+              <a:t>Goals:</a:t>
+            </a:r>
+            <a:endParaRPr lang="en-US" dirty="0">
+              <a:solidFill>
+                <a:schemeClr val="tx1"/>
+              </a:solidFill>
+            </a:endParaRPr>
+          </a:p>
+          <a:p>
+            <a:pPr>
+              <a:buFont typeface="Arial" panose="020B0604020202020204" pitchFamily="34" charset="0"/>
+              <a:buChar char="•"/>
+            </a:pPr>
+            <a:r>
+              <a:rPr lang="en-US" dirty="0">
+                <a:solidFill>
+                  <a:schemeClr val="tx1"/>
+                </a:solidFill>
+              </a:rPr>
+              <a:t>Deploy and version ML models in Kubernetes.</a:t>
+            </a:r>
+          </a:p>
+          <a:p>
+            <a:pPr>
+              <a:buFont typeface="Arial" panose="020B0604020202020204" pitchFamily="34" charset="0"/>
+              <a:buChar char="•"/>
+            </a:pPr>
+            <a:r>
+              <a:rPr lang="en-US" dirty="0">
+                <a:solidFill>
+                  <a:schemeClr val="tx1"/>
+                </a:solidFill>
+              </a:rPr>
+              <a:t>Automatic API documentation and request validation.</a:t>
+            </a:r>
+          </a:p>
+          <a:p>
+            <a:pPr>
+              <a:buFont typeface="Arial" panose="020B0604020202020204" pitchFamily="34" charset="0"/>
+              <a:buChar char="•"/>
+            </a:pPr>
+            <a:r>
+              <a:rPr lang="en-US" dirty="0">
+                <a:solidFill>
+                  <a:schemeClr val="tx1"/>
+                </a:solidFill>
+              </a:rPr>
+              <a:t>Flexibility for different ML frameworks.</a:t>
+            </a:r>
+          </a:p>
+          <a:p>
+            <a:pPr marL="139700" indent="0">
+              <a:buNone/>
+            </a:pPr>
+            <a:endParaRPr lang="ru-RU" b="1" dirty="0">
+              <a:solidFill>
+                <a:schemeClr val="tx1"/>
+              </a:solidFill>
+            </a:endParaRPr>
+          </a:p>
+          <a:p>
+            <a:pPr marL="139700" indent="0">
+              <a:buNone/>
+            </a:pPr>
+            <a:endParaRPr lang="ru-RU" b="1" dirty="0">
+              <a:solidFill>
+                <a:schemeClr val="tx1"/>
+              </a:solidFill>
+            </a:endParaRPr>
+          </a:p>
+          <a:p>
+            <a:pPr marL="139700" indent="0">
+              <a:buNone/>
+            </a:pPr>
+            <a:r>
+              <a:rPr lang="en-US" b="1" dirty="0">
+                <a:solidFill>
+                  <a:schemeClr val="tx1"/>
+                </a:solidFill>
+              </a:rPr>
+              <a:t>Pain points:</a:t>
+            </a:r>
+            <a:endParaRPr lang="en-US" dirty="0">
+              <a:solidFill>
+                <a:schemeClr val="tx1"/>
+              </a:solidFill>
+            </a:endParaRPr>
+          </a:p>
+          <a:p>
+            <a:pPr>
+              <a:buFont typeface="Arial" panose="020B0604020202020204" pitchFamily="34" charset="0"/>
+              <a:buChar char="•"/>
+            </a:pPr>
+            <a:r>
+              <a:rPr lang="en-US" dirty="0">
+                <a:solidFill>
+                  <a:schemeClr val="tx1"/>
+                </a:solidFill>
+              </a:rPr>
+              <a:t>Manual API documentation.</a:t>
+            </a:r>
+          </a:p>
+          <a:p>
+            <a:pPr>
+              <a:buFont typeface="Arial" panose="020B0604020202020204" pitchFamily="34" charset="0"/>
+              <a:buChar char="•"/>
+            </a:pPr>
+            <a:r>
+              <a:rPr lang="en-US" dirty="0">
+                <a:solidFill>
+                  <a:schemeClr val="tx1"/>
+                </a:solidFill>
+              </a:rPr>
+              <a:t>Difficulties in monitoring model performance.</a:t>
+            </a:r>
+          </a:p>
+        </p:txBody>
+      </p:sp>
+      <p:sp>
+        <p:nvSpPr>
+          <p:cNvPr id="7" name="Google Shape;66;p15">
+            <a:extLst>
+              <a:ext uri="{FF2B5EF4-FFF2-40B4-BE49-F238E27FC236}">
+                <a16:creationId xmlns:a16="http://schemas.microsoft.com/office/drawing/2014/main" id="{A2B7074F-A1D8-444B-9DA8-BFF70B4A2A8A}"/>
+              </a:ext>
+            </a:extLst>
+          </p:cNvPr>
+          <p:cNvSpPr txBox="1">
+            <a:spLocks/>
+          </p:cNvSpPr>
+          <p:nvPr/>
+        </p:nvSpPr>
+        <p:spPr>
+          <a:xfrm>
+            <a:off x="252575" y="140425"/>
+            <a:ext cx="8520600" cy="572700"/>
+          </a:xfrm>
+          <a:prstGeom prst="rect">
+            <a:avLst/>
+          </a:prstGeom>
+          <a:noFill/>
+          <a:ln>
+            <a:noFill/>
+          </a:ln>
+        </p:spPr>
+        <p:txBody>
+          <a:bodyPr spcFirstLastPara="1" wrap="square" lIns="91425" tIns="91425" rIns="91425" bIns="91425" anchor="t" anchorCtr="0">
+            <a:noAutofit/>
+          </a:bodyPr>
+          <a:lstStyle>
+            <a:defPPr marR="0" lvl="0" algn="l" rtl="0">
+              <a:lnSpc>
+                <a:spcPct val="100000"/>
+              </a:lnSpc>
+              <a:spcBef>
+                <a:spcPts val="0"/>
+              </a:spcBef>
+              <a:spcAft>
+                <a:spcPts val="0"/>
+              </a:spcAft>
+            </a:defPPr>
+            <a:lvl1pPr marR="0" lvl="0" algn="l" rtl="0">
+              <a:lnSpc>
+                <a:spcPct val="100000"/>
+              </a:lnSpc>
+              <a:spcBef>
+                <a:spcPts val="0"/>
+              </a:spcBef>
+              <a:spcAft>
+                <a:spcPts val="0"/>
+              </a:spcAft>
+              <a:buClr>
+                <a:schemeClr val="dk1"/>
+              </a:buClr>
+              <a:buSzPts val="2800"/>
+              <a:buFont typeface="Arial"/>
+              <a:buNone/>
+              <a:defRPr sz="2800" b="0" i="0" u="none" strike="noStrike" cap="none">
+                <a:solidFill>
+                  <a:schemeClr val="dk1"/>
+                </a:solidFill>
+                <a:latin typeface="Arial"/>
+                <a:ea typeface="Arial"/>
+                <a:cs typeface="Arial"/>
+                <a:sym typeface="Arial"/>
+              </a:defRPr>
+            </a:lvl1pPr>
+            <a:lvl2pPr marR="0" lvl="1" algn="l" rtl="0">
+              <a:lnSpc>
+                <a:spcPct val="100000"/>
+              </a:lnSpc>
+              <a:spcBef>
+                <a:spcPts val="0"/>
+              </a:spcBef>
+              <a:spcAft>
+                <a:spcPts val="0"/>
+              </a:spcAft>
+              <a:buClr>
+                <a:schemeClr val="dk1"/>
+              </a:buClr>
+              <a:buSzPts val="2800"/>
+              <a:buFont typeface="Arial"/>
+              <a:buNone/>
+              <a:defRPr sz="2800" b="0" i="0" u="none" strike="noStrike" cap="none">
+                <a:solidFill>
+                  <a:schemeClr val="dk1"/>
+                </a:solidFill>
+                <a:latin typeface="Arial"/>
+                <a:ea typeface="Arial"/>
+                <a:cs typeface="Arial"/>
+                <a:sym typeface="Arial"/>
+              </a:defRPr>
+            </a:lvl2pPr>
+            <a:lvl3pPr marR="0" lvl="2" algn="l" rtl="0">
+              <a:lnSpc>
+                <a:spcPct val="100000"/>
+              </a:lnSpc>
+              <a:spcBef>
+                <a:spcPts val="0"/>
+              </a:spcBef>
+              <a:spcAft>
+                <a:spcPts val="0"/>
+              </a:spcAft>
+              <a:buClr>
+                <a:schemeClr val="dk1"/>
+              </a:buClr>
+              <a:buSzPts val="2800"/>
+              <a:buFont typeface="Arial"/>
+              <a:buNone/>
+              <a:defRPr sz="2800" b="0" i="0" u="none" strike="noStrike" cap="none">
+                <a:solidFill>
+                  <a:schemeClr val="dk1"/>
+                </a:solidFill>
+                <a:latin typeface="Arial"/>
+                <a:ea typeface="Arial"/>
+                <a:cs typeface="Arial"/>
+                <a:sym typeface="Arial"/>
+              </a:defRPr>
+            </a:lvl3pPr>
+            <a:lvl4pPr marR="0" lvl="3" algn="l" rtl="0">
+              <a:lnSpc>
+                <a:spcPct val="100000"/>
+              </a:lnSpc>
+              <a:spcBef>
+                <a:spcPts val="0"/>
+              </a:spcBef>
+              <a:spcAft>
+                <a:spcPts val="0"/>
+              </a:spcAft>
+              <a:buClr>
+                <a:schemeClr val="dk1"/>
+              </a:buClr>
+              <a:buSzPts val="2800"/>
+              <a:buFont typeface="Arial"/>
+              <a:buNone/>
+              <a:defRPr sz="2800" b="0" i="0" u="none" strike="noStrike" cap="none">
+                <a:solidFill>
+                  <a:schemeClr val="dk1"/>
+                </a:solidFill>
+                <a:latin typeface="Arial"/>
+                <a:ea typeface="Arial"/>
+                <a:cs typeface="Arial"/>
+                <a:sym typeface="Arial"/>
+              </a:defRPr>
+            </a:lvl4pPr>
+            <a:lvl5pPr marR="0" lvl="4" algn="l" rtl="0">
+              <a:lnSpc>
+                <a:spcPct val="100000"/>
+              </a:lnSpc>
+              <a:spcBef>
+                <a:spcPts val="0"/>
+              </a:spcBef>
+              <a:spcAft>
+                <a:spcPts val="0"/>
+              </a:spcAft>
+              <a:buClr>
+                <a:schemeClr val="dk1"/>
+              </a:buClr>
+              <a:buSzPts val="2800"/>
+              <a:buFont typeface="Arial"/>
+              <a:buNone/>
+              <a:defRPr sz="2800" b="0" i="0" u="none" strike="noStrike" cap="none">
+                <a:solidFill>
+                  <a:schemeClr val="dk1"/>
+                </a:solidFill>
+                <a:latin typeface="Arial"/>
+                <a:ea typeface="Arial"/>
+                <a:cs typeface="Arial"/>
+                <a:sym typeface="Arial"/>
+              </a:defRPr>
+            </a:lvl5pPr>
+            <a:lvl6pPr marR="0" lvl="5" algn="l" rtl="0">
+              <a:lnSpc>
+                <a:spcPct val="100000"/>
+              </a:lnSpc>
+              <a:spcBef>
+                <a:spcPts val="0"/>
+              </a:spcBef>
+              <a:spcAft>
+                <a:spcPts val="0"/>
+              </a:spcAft>
+              <a:buClr>
+                <a:schemeClr val="dk1"/>
+              </a:buClr>
+              <a:buSzPts val="2800"/>
+              <a:buFont typeface="Arial"/>
+              <a:buNone/>
+              <a:defRPr sz="2800" b="0" i="0" u="none" strike="noStrike" cap="none">
+                <a:solidFill>
+                  <a:schemeClr val="dk1"/>
+                </a:solidFill>
+                <a:latin typeface="Arial"/>
+                <a:ea typeface="Arial"/>
+                <a:cs typeface="Arial"/>
+                <a:sym typeface="Arial"/>
+              </a:defRPr>
+            </a:lvl6pPr>
+            <a:lvl7pPr marR="0" lvl="6" algn="l" rtl="0">
+              <a:lnSpc>
+                <a:spcPct val="100000"/>
+              </a:lnSpc>
+              <a:spcBef>
+                <a:spcPts val="0"/>
+              </a:spcBef>
+              <a:spcAft>
+                <a:spcPts val="0"/>
+              </a:spcAft>
+              <a:buClr>
+                <a:schemeClr val="dk1"/>
+              </a:buClr>
+              <a:buSzPts val="2800"/>
+              <a:buFont typeface="Arial"/>
+              <a:buNone/>
+              <a:defRPr sz="2800" b="0" i="0" u="none" strike="noStrike" cap="none">
+                <a:solidFill>
+                  <a:schemeClr val="dk1"/>
+                </a:solidFill>
+                <a:latin typeface="Arial"/>
+                <a:ea typeface="Arial"/>
+                <a:cs typeface="Arial"/>
+                <a:sym typeface="Arial"/>
+              </a:defRPr>
+            </a:lvl7pPr>
+            <a:lvl8pPr marR="0" lvl="7" algn="l" rtl="0">
+              <a:lnSpc>
+                <a:spcPct val="100000"/>
+              </a:lnSpc>
+              <a:spcBef>
+                <a:spcPts val="0"/>
+              </a:spcBef>
+              <a:spcAft>
+                <a:spcPts val="0"/>
+              </a:spcAft>
+              <a:buClr>
+                <a:schemeClr val="dk1"/>
+              </a:buClr>
+              <a:buSzPts val="2800"/>
+              <a:buFont typeface="Arial"/>
+              <a:buNone/>
+              <a:defRPr sz="2800" b="0" i="0" u="none" strike="noStrike" cap="none">
+                <a:solidFill>
+                  <a:schemeClr val="dk1"/>
+                </a:solidFill>
+                <a:latin typeface="Arial"/>
+                <a:ea typeface="Arial"/>
+                <a:cs typeface="Arial"/>
+                <a:sym typeface="Arial"/>
+              </a:defRPr>
+            </a:lvl8pPr>
+            <a:lvl9pPr marR="0" lvl="8" algn="l" rtl="0">
+              <a:lnSpc>
+                <a:spcPct val="100000"/>
+              </a:lnSpc>
+              <a:spcBef>
+                <a:spcPts val="0"/>
+              </a:spcBef>
+              <a:spcAft>
+                <a:spcPts val="0"/>
+              </a:spcAft>
+              <a:buClr>
+                <a:schemeClr val="dk1"/>
+              </a:buClr>
+              <a:buSzPts val="2800"/>
+              <a:buFont typeface="Arial"/>
+              <a:buNone/>
+              <a:defRPr sz="2800" b="0" i="0" u="none" strike="noStrike" cap="none">
+                <a:solidFill>
+                  <a:schemeClr val="dk1"/>
+                </a:solidFill>
+                <a:latin typeface="Arial"/>
+                <a:ea typeface="Arial"/>
+                <a:cs typeface="Arial"/>
+                <a:sym typeface="Arial"/>
+              </a:defRPr>
+            </a:lvl9pPr>
+          </a:lstStyle>
+          <a:p>
+            <a:r>
+              <a:rPr lang="en-GB" dirty="0"/>
+              <a:t>Personas</a:t>
+            </a:r>
+          </a:p>
+        </p:txBody>
+      </p:sp>
+      <p:sp>
+        <p:nvSpPr>
+          <p:cNvPr id="8" name="TextBox 7">
+            <a:extLst>
+              <a:ext uri="{FF2B5EF4-FFF2-40B4-BE49-F238E27FC236}">
+                <a16:creationId xmlns:a16="http://schemas.microsoft.com/office/drawing/2014/main" id="{4B40FD6D-82C8-48B1-A5D3-456D8792334C}"/>
+              </a:ext>
+            </a:extLst>
+          </p:cNvPr>
+          <p:cNvSpPr txBox="1"/>
+          <p:nvPr/>
+        </p:nvSpPr>
+        <p:spPr>
+          <a:xfrm>
+            <a:off x="4666129" y="863550"/>
+            <a:ext cx="4269442" cy="3539430"/>
+          </a:xfrm>
+          <a:prstGeom prst="rect">
+            <a:avLst/>
+          </a:prstGeom>
+          <a:noFill/>
+        </p:spPr>
+        <p:txBody>
+          <a:bodyPr wrap="square" rtlCol="0">
+            <a:spAutoFit/>
+          </a:bodyPr>
+          <a:lstStyle/>
+          <a:p>
+            <a:r>
+              <a:rPr lang="en-US" b="1" dirty="0">
+                <a:solidFill>
+                  <a:schemeClr val="tx1"/>
+                </a:solidFill>
+              </a:rPr>
+              <a:t>Backend Developer (Alexander, 28 years old)</a:t>
+            </a:r>
+          </a:p>
+          <a:p>
+            <a:br>
+              <a:rPr lang="en-US" dirty="0">
+                <a:solidFill>
+                  <a:schemeClr val="tx1"/>
+                </a:solidFill>
+              </a:rPr>
+            </a:br>
+            <a:r>
+              <a:rPr lang="en-US" b="1" dirty="0">
+                <a:solidFill>
+                  <a:schemeClr val="tx1"/>
+                </a:solidFill>
+              </a:rPr>
+              <a:t>Goals:</a:t>
+            </a:r>
+            <a:endParaRPr lang="en-US" dirty="0">
+              <a:solidFill>
+                <a:schemeClr val="tx1"/>
+              </a:solidFill>
+            </a:endParaRPr>
+          </a:p>
+          <a:p>
+            <a:pPr marL="285750" indent="-285750">
+              <a:buFont typeface="Arial" panose="020B0604020202020204" pitchFamily="34" charset="0"/>
+              <a:buChar char="•"/>
+            </a:pPr>
+            <a:r>
+              <a:rPr lang="en-US" dirty="0">
+                <a:solidFill>
+                  <a:schemeClr val="tx1"/>
+                </a:solidFill>
+              </a:rPr>
+              <a:t>Use automatic </a:t>
+            </a:r>
+            <a:r>
+              <a:rPr lang="en-US" dirty="0" err="1">
+                <a:solidFill>
+                  <a:schemeClr val="tx1"/>
+                </a:solidFill>
+              </a:rPr>
+              <a:t>OpenAPI</a:t>
+            </a:r>
+            <a:r>
+              <a:rPr lang="en-US" dirty="0">
+                <a:solidFill>
+                  <a:schemeClr val="tx1"/>
+                </a:solidFill>
+              </a:rPr>
+              <a:t> schema generation.</a:t>
+            </a:r>
+          </a:p>
+          <a:p>
+            <a:pPr marL="285750" indent="-285750">
+              <a:buFont typeface="Arial" panose="020B0604020202020204" pitchFamily="34" charset="0"/>
+              <a:buChar char="•"/>
+            </a:pPr>
+            <a:r>
+              <a:rPr lang="en-US" dirty="0">
+                <a:solidFill>
+                  <a:schemeClr val="tx1"/>
+                </a:solidFill>
+              </a:rPr>
+              <a:t>Easily add API endpoints with request validation and security.</a:t>
+            </a:r>
+            <a:endParaRPr lang="ru-RU" dirty="0">
+              <a:solidFill>
+                <a:schemeClr val="tx1"/>
+              </a:solidFill>
+            </a:endParaRPr>
+          </a:p>
+          <a:p>
+            <a:pPr marL="285750" indent="-285750">
+              <a:buFont typeface="Arial" panose="020B0604020202020204" pitchFamily="34" charset="0"/>
+              <a:buChar char="•"/>
+            </a:pPr>
+            <a:endParaRPr lang="en-US" dirty="0">
+              <a:solidFill>
+                <a:schemeClr val="tx1"/>
+              </a:solidFill>
+            </a:endParaRPr>
+          </a:p>
+          <a:p>
+            <a:endParaRPr lang="ru-RU" b="1" dirty="0">
+              <a:solidFill>
+                <a:schemeClr val="tx1"/>
+              </a:solidFill>
+            </a:endParaRPr>
+          </a:p>
+          <a:p>
+            <a:endParaRPr lang="ru-RU" b="1" dirty="0">
+              <a:solidFill>
+                <a:schemeClr val="tx1"/>
+              </a:solidFill>
+            </a:endParaRPr>
+          </a:p>
+          <a:p>
+            <a:endParaRPr lang="ru-RU" b="1" dirty="0">
+              <a:solidFill>
+                <a:schemeClr val="tx1"/>
+              </a:solidFill>
+            </a:endParaRPr>
+          </a:p>
+          <a:p>
+            <a:endParaRPr lang="ru-RU" b="1" dirty="0">
+              <a:solidFill>
+                <a:schemeClr val="tx1"/>
+              </a:solidFill>
+            </a:endParaRPr>
+          </a:p>
+          <a:p>
+            <a:r>
+              <a:rPr lang="en-US" b="1" dirty="0">
+                <a:solidFill>
+                  <a:schemeClr val="tx1"/>
+                </a:solidFill>
+              </a:rPr>
+              <a:t>Pain points:</a:t>
+            </a:r>
+            <a:endParaRPr lang="en-US" dirty="0">
+              <a:solidFill>
+                <a:schemeClr val="tx1"/>
+              </a:solidFill>
+            </a:endParaRPr>
+          </a:p>
+          <a:p>
+            <a:pPr marL="285750" indent="-285750">
+              <a:buFont typeface="Arial" panose="020B0604020202020204" pitchFamily="34" charset="0"/>
+              <a:buChar char="•"/>
+            </a:pPr>
+            <a:r>
+              <a:rPr lang="en-US" dirty="0">
+                <a:solidFill>
+                  <a:schemeClr val="tx1"/>
+                </a:solidFill>
+              </a:rPr>
+              <a:t>Manual API documentation.</a:t>
+            </a:r>
+          </a:p>
+          <a:p>
+            <a:pPr marL="285750" indent="-285750">
+              <a:buFont typeface="Arial" panose="020B0604020202020204" pitchFamily="34" charset="0"/>
+              <a:buChar char="•"/>
+            </a:pPr>
+            <a:r>
+              <a:rPr lang="en-US" dirty="0">
+                <a:solidFill>
+                  <a:schemeClr val="tx1"/>
+                </a:solidFill>
+              </a:rPr>
+              <a:t>Challenges with integrating authorization and managing access control.</a:t>
+            </a:r>
+          </a:p>
+          <a:p>
+            <a:endParaRPr lang="ru-RU" dirty="0">
+              <a:solidFill>
+                <a:schemeClr val="tx1"/>
+              </a:solidFill>
+            </a:endParaRPr>
+          </a:p>
+        </p:txBody>
+      </p:sp>
+    </p:spTree>
+    <p:extLst>
+      <p:ext uri="{BB962C8B-B14F-4D97-AF65-F5344CB8AC3E}">
+        <p14:creationId xmlns:p14="http://schemas.microsoft.com/office/powerpoint/2010/main" val="2730667058"/>
+      </p:ext>
+    </p:extLst>
+  </p:cSld>
+  <p:clrMapOvr>
+    <a:masterClrMapping/>
+  </p:clrMapOvr>
+</p:sld>
+</file>
+
+<file path=ppt/slides/slide5.xml><?xml version="1.0" encoding="utf-8"?>
+<p:sld xmlns:a="http://schemas.openxmlformats.org/drawingml/2006/main" xmlns:r="http://schemas.openxmlformats.org/officeDocument/2006/relationships" xmlns:p="http://schemas.openxmlformats.org/presentationml/2006/main">
+  <p:cSld>
+    <p:spTree>
+      <p:nvGrpSpPr>
+        <p:cNvPr id="1" name=""/>
+        <p:cNvGrpSpPr/>
+        <p:nvPr/>
+      </p:nvGrpSpPr>
+      <p:grpSpPr>
+        <a:xfrm>
+          <a:off x="0" y="0"/>
+          <a:ext cx="0" cy="0"/>
+          <a:chOff x="0" y="0"/>
+          <a:chExt cx="0" cy="0"/>
+        </a:xfrm>
+      </p:grpSpPr>
+      <p:sp>
+        <p:nvSpPr>
+          <p:cNvPr id="7" name="Google Shape;66;p15">
+            <a:extLst>
+              <a:ext uri="{FF2B5EF4-FFF2-40B4-BE49-F238E27FC236}">
+                <a16:creationId xmlns:a16="http://schemas.microsoft.com/office/drawing/2014/main" id="{A2B7074F-A1D8-444B-9DA8-BFF70B4A2A8A}"/>
+              </a:ext>
+            </a:extLst>
+          </p:cNvPr>
+          <p:cNvSpPr txBox="1">
+            <a:spLocks/>
+          </p:cNvSpPr>
+          <p:nvPr/>
+        </p:nvSpPr>
+        <p:spPr>
+          <a:xfrm>
+            <a:off x="252575" y="140425"/>
+            <a:ext cx="8520600" cy="572700"/>
+          </a:xfrm>
+          <a:prstGeom prst="rect">
+            <a:avLst/>
+          </a:prstGeom>
+          <a:noFill/>
+          <a:ln>
+            <a:noFill/>
+          </a:ln>
+        </p:spPr>
+        <p:txBody>
+          <a:bodyPr spcFirstLastPara="1" wrap="square" lIns="91425" tIns="91425" rIns="91425" bIns="91425" anchor="t" anchorCtr="0">
+            <a:noAutofit/>
+          </a:bodyPr>
+          <a:lstStyle>
+            <a:defPPr marR="0" lvl="0" algn="l" rtl="0">
+              <a:lnSpc>
+                <a:spcPct val="100000"/>
+              </a:lnSpc>
+              <a:spcBef>
+                <a:spcPts val="0"/>
+              </a:spcBef>
+              <a:spcAft>
+                <a:spcPts val="0"/>
+              </a:spcAft>
+            </a:defPPr>
+            <a:lvl1pPr marR="0" lvl="0" algn="l" rtl="0">
+              <a:lnSpc>
+                <a:spcPct val="100000"/>
+              </a:lnSpc>
+              <a:spcBef>
+                <a:spcPts val="0"/>
+              </a:spcBef>
+              <a:spcAft>
+                <a:spcPts val="0"/>
+              </a:spcAft>
+              <a:buClr>
+                <a:schemeClr val="dk1"/>
+              </a:buClr>
+              <a:buSzPts val="2800"/>
+              <a:buFont typeface="Arial"/>
+              <a:buNone/>
+              <a:defRPr sz="2800" b="0" i="0" u="none" strike="noStrike" cap="none">
+                <a:solidFill>
+                  <a:schemeClr val="dk1"/>
+                </a:solidFill>
+                <a:latin typeface="Arial"/>
+                <a:ea typeface="Arial"/>
+                <a:cs typeface="Arial"/>
+                <a:sym typeface="Arial"/>
+              </a:defRPr>
+            </a:lvl1pPr>
+            <a:lvl2pPr marR="0" lvl="1" algn="l" rtl="0">
+              <a:lnSpc>
+                <a:spcPct val="100000"/>
+              </a:lnSpc>
+              <a:spcBef>
+                <a:spcPts val="0"/>
+              </a:spcBef>
+              <a:spcAft>
+                <a:spcPts val="0"/>
+              </a:spcAft>
+              <a:buClr>
+                <a:schemeClr val="dk1"/>
+              </a:buClr>
+              <a:buSzPts val="2800"/>
+              <a:buFont typeface="Arial"/>
+              <a:buNone/>
+              <a:defRPr sz="2800" b="0" i="0" u="none" strike="noStrike" cap="none">
+                <a:solidFill>
+                  <a:schemeClr val="dk1"/>
+                </a:solidFill>
+                <a:latin typeface="Arial"/>
+                <a:ea typeface="Arial"/>
+                <a:cs typeface="Arial"/>
+                <a:sym typeface="Arial"/>
+              </a:defRPr>
+            </a:lvl2pPr>
+            <a:lvl3pPr marR="0" lvl="2" algn="l" rtl="0">
+              <a:lnSpc>
+                <a:spcPct val="100000"/>
+              </a:lnSpc>
+              <a:spcBef>
+                <a:spcPts val="0"/>
+              </a:spcBef>
+              <a:spcAft>
+                <a:spcPts val="0"/>
+              </a:spcAft>
+              <a:buClr>
+                <a:schemeClr val="dk1"/>
+              </a:buClr>
+              <a:buSzPts val="2800"/>
+              <a:buFont typeface="Arial"/>
+              <a:buNone/>
+              <a:defRPr sz="2800" b="0" i="0" u="none" strike="noStrike" cap="none">
+                <a:solidFill>
+                  <a:schemeClr val="dk1"/>
+                </a:solidFill>
+                <a:latin typeface="Arial"/>
+                <a:ea typeface="Arial"/>
+                <a:cs typeface="Arial"/>
+                <a:sym typeface="Arial"/>
+              </a:defRPr>
+            </a:lvl3pPr>
+            <a:lvl4pPr marR="0" lvl="3" algn="l" rtl="0">
+              <a:lnSpc>
+                <a:spcPct val="100000"/>
+              </a:lnSpc>
+              <a:spcBef>
+                <a:spcPts val="0"/>
+              </a:spcBef>
+              <a:spcAft>
+                <a:spcPts val="0"/>
+              </a:spcAft>
+              <a:buClr>
+                <a:schemeClr val="dk1"/>
+              </a:buClr>
+              <a:buSzPts val="2800"/>
+              <a:buFont typeface="Arial"/>
+              <a:buNone/>
+              <a:defRPr sz="2800" b="0" i="0" u="none" strike="noStrike" cap="none">
+                <a:solidFill>
+                  <a:schemeClr val="dk1"/>
+                </a:solidFill>
+                <a:latin typeface="Arial"/>
+                <a:ea typeface="Arial"/>
+                <a:cs typeface="Arial"/>
+                <a:sym typeface="Arial"/>
+              </a:defRPr>
+            </a:lvl4pPr>
+            <a:lvl5pPr marR="0" lvl="4" algn="l" rtl="0">
+              <a:lnSpc>
+                <a:spcPct val="100000"/>
+              </a:lnSpc>
+              <a:spcBef>
+                <a:spcPts val="0"/>
+              </a:spcBef>
+              <a:spcAft>
+                <a:spcPts val="0"/>
+              </a:spcAft>
+              <a:buClr>
+                <a:schemeClr val="dk1"/>
+              </a:buClr>
+              <a:buSzPts val="2800"/>
+              <a:buFont typeface="Arial"/>
+              <a:buNone/>
+              <a:defRPr sz="2800" b="0" i="0" u="none" strike="noStrike" cap="none">
+                <a:solidFill>
+                  <a:schemeClr val="dk1"/>
+                </a:solidFill>
+                <a:latin typeface="Arial"/>
+                <a:ea typeface="Arial"/>
+                <a:cs typeface="Arial"/>
+                <a:sym typeface="Arial"/>
+              </a:defRPr>
+            </a:lvl5pPr>
+            <a:lvl6pPr marR="0" lvl="5" algn="l" rtl="0">
+              <a:lnSpc>
+                <a:spcPct val="100000"/>
+              </a:lnSpc>
+              <a:spcBef>
+                <a:spcPts val="0"/>
+              </a:spcBef>
+              <a:spcAft>
+                <a:spcPts val="0"/>
+              </a:spcAft>
+              <a:buClr>
+                <a:schemeClr val="dk1"/>
+              </a:buClr>
+              <a:buSzPts val="2800"/>
+              <a:buFont typeface="Arial"/>
+              <a:buNone/>
+              <a:defRPr sz="2800" b="0" i="0" u="none" strike="noStrike" cap="none">
+                <a:solidFill>
+                  <a:schemeClr val="dk1"/>
+                </a:solidFill>
+                <a:latin typeface="Arial"/>
+                <a:ea typeface="Arial"/>
+                <a:cs typeface="Arial"/>
+                <a:sym typeface="Arial"/>
+              </a:defRPr>
+            </a:lvl6pPr>
+            <a:lvl7pPr marR="0" lvl="6" algn="l" rtl="0">
+              <a:lnSpc>
+                <a:spcPct val="100000"/>
+              </a:lnSpc>
+              <a:spcBef>
+                <a:spcPts val="0"/>
+              </a:spcBef>
+              <a:spcAft>
+                <a:spcPts val="0"/>
+              </a:spcAft>
+              <a:buClr>
+                <a:schemeClr val="dk1"/>
+              </a:buClr>
+              <a:buSzPts val="2800"/>
+              <a:buFont typeface="Arial"/>
+              <a:buNone/>
+              <a:defRPr sz="2800" b="0" i="0" u="none" strike="noStrike" cap="none">
+                <a:solidFill>
+                  <a:schemeClr val="dk1"/>
+                </a:solidFill>
+                <a:latin typeface="Arial"/>
+                <a:ea typeface="Arial"/>
+                <a:cs typeface="Arial"/>
+                <a:sym typeface="Arial"/>
+              </a:defRPr>
+            </a:lvl7pPr>
+            <a:lvl8pPr marR="0" lvl="7" algn="l" rtl="0">
+              <a:lnSpc>
+                <a:spcPct val="100000"/>
+              </a:lnSpc>
+              <a:spcBef>
+                <a:spcPts val="0"/>
+              </a:spcBef>
+              <a:spcAft>
+                <a:spcPts val="0"/>
+              </a:spcAft>
+              <a:buClr>
+                <a:schemeClr val="dk1"/>
+              </a:buClr>
+              <a:buSzPts val="2800"/>
+              <a:buFont typeface="Arial"/>
+              <a:buNone/>
+              <a:defRPr sz="2800" b="0" i="0" u="none" strike="noStrike" cap="none">
+                <a:solidFill>
+                  <a:schemeClr val="dk1"/>
+                </a:solidFill>
+                <a:latin typeface="Arial"/>
+                <a:ea typeface="Arial"/>
+                <a:cs typeface="Arial"/>
+                <a:sym typeface="Arial"/>
+              </a:defRPr>
+            </a:lvl8pPr>
+            <a:lvl9pPr marR="0" lvl="8" algn="l" rtl="0">
+              <a:lnSpc>
+                <a:spcPct val="100000"/>
+              </a:lnSpc>
+              <a:spcBef>
+                <a:spcPts val="0"/>
+              </a:spcBef>
+              <a:spcAft>
+                <a:spcPts val="0"/>
+              </a:spcAft>
+              <a:buClr>
+                <a:schemeClr val="dk1"/>
+              </a:buClr>
+              <a:buSzPts val="2800"/>
+              <a:buFont typeface="Arial"/>
+              <a:buNone/>
+              <a:defRPr sz="2800" b="0" i="0" u="none" strike="noStrike" cap="none">
+                <a:solidFill>
+                  <a:schemeClr val="dk1"/>
+                </a:solidFill>
+                <a:latin typeface="Arial"/>
+                <a:ea typeface="Arial"/>
+                <a:cs typeface="Arial"/>
+                <a:sym typeface="Arial"/>
+              </a:defRPr>
+            </a:lvl9pPr>
+          </a:lstStyle>
+          <a:p>
+            <a:r>
+              <a:rPr lang="en-GB" dirty="0"/>
+              <a:t>Personas</a:t>
+            </a:r>
+          </a:p>
+        </p:txBody>
+      </p:sp>
+      <p:sp>
+        <p:nvSpPr>
+          <p:cNvPr id="8" name="TextBox 7">
+            <a:extLst>
+              <a:ext uri="{FF2B5EF4-FFF2-40B4-BE49-F238E27FC236}">
+                <a16:creationId xmlns:a16="http://schemas.microsoft.com/office/drawing/2014/main" id="{4B40FD6D-82C8-48B1-A5D3-456D8792334C}"/>
+              </a:ext>
+            </a:extLst>
+          </p:cNvPr>
+          <p:cNvSpPr txBox="1"/>
+          <p:nvPr/>
+        </p:nvSpPr>
+        <p:spPr>
+          <a:xfrm>
+            <a:off x="4666129" y="903891"/>
+            <a:ext cx="4269442" cy="3539430"/>
+          </a:xfrm>
+          <a:prstGeom prst="rect">
+            <a:avLst/>
+          </a:prstGeom>
+          <a:noFill/>
+        </p:spPr>
+        <p:txBody>
+          <a:bodyPr wrap="square" rtlCol="0">
+            <a:spAutoFit/>
+          </a:bodyPr>
+          <a:lstStyle/>
+          <a:p>
+            <a:r>
+              <a:rPr lang="en-US" b="1" dirty="0"/>
+              <a:t>Corporate Client (Yandex, </a:t>
+            </a:r>
+            <a:r>
+              <a:rPr lang="en-US" b="1" dirty="0" err="1"/>
+              <a:t>Sber</a:t>
+            </a:r>
+            <a:r>
+              <a:rPr lang="en-US" b="1" dirty="0"/>
+              <a:t>)</a:t>
+            </a:r>
+          </a:p>
+          <a:p>
+            <a:br>
+              <a:rPr lang="en-US" dirty="0"/>
+            </a:br>
+            <a:r>
+              <a:rPr lang="en-US" b="1" dirty="0"/>
+              <a:t>Goals:</a:t>
+            </a:r>
+            <a:endParaRPr lang="en-US" dirty="0"/>
+          </a:p>
+          <a:p>
+            <a:pPr marL="285750" indent="-285750">
+              <a:buFont typeface="Arial" panose="020B0604020202020204" pitchFamily="34" charset="0"/>
+              <a:buChar char="•"/>
+            </a:pPr>
+            <a:r>
+              <a:rPr lang="en-US" dirty="0"/>
+              <a:t>Scalable and secure deployment of ML models.</a:t>
+            </a:r>
+          </a:p>
+          <a:p>
+            <a:pPr marL="285750" indent="-285750">
+              <a:buFont typeface="Arial" panose="020B0604020202020204" pitchFamily="34" charset="0"/>
+              <a:buChar char="•"/>
+            </a:pPr>
+            <a:r>
+              <a:rPr lang="en-US" dirty="0"/>
+              <a:t>Integration of the API gateway into existing infrastructure.</a:t>
+            </a:r>
+          </a:p>
+          <a:p>
+            <a:pPr>
+              <a:buFont typeface="Arial" panose="020B0604020202020204" pitchFamily="34" charset="0"/>
+              <a:buChar char="•"/>
+            </a:pPr>
+            <a:endParaRPr lang="en-US" dirty="0"/>
+          </a:p>
+          <a:p>
+            <a:pPr>
+              <a:buFont typeface="Arial" panose="020B0604020202020204" pitchFamily="34" charset="0"/>
+              <a:buChar char="•"/>
+            </a:pPr>
+            <a:endParaRPr lang="en-US" dirty="0"/>
+          </a:p>
+          <a:p>
+            <a:pPr>
+              <a:buFont typeface="Arial" panose="020B0604020202020204" pitchFamily="34" charset="0"/>
+              <a:buChar char="•"/>
+            </a:pPr>
+            <a:endParaRPr lang="en-US" dirty="0"/>
+          </a:p>
+          <a:p>
+            <a:pPr>
+              <a:buFont typeface="Arial" panose="020B0604020202020204" pitchFamily="34" charset="0"/>
+              <a:buChar char="•"/>
+            </a:pPr>
+            <a:endParaRPr lang="en-US" dirty="0"/>
+          </a:p>
+          <a:p>
+            <a:pPr>
+              <a:buFont typeface="Arial" panose="020B0604020202020204" pitchFamily="34" charset="0"/>
+              <a:buChar char="•"/>
+            </a:pPr>
+            <a:endParaRPr lang="en-US" dirty="0"/>
+          </a:p>
+          <a:p>
+            <a:pPr>
+              <a:buFont typeface="Arial" panose="020B0604020202020204" pitchFamily="34" charset="0"/>
+              <a:buChar char="•"/>
+            </a:pPr>
+            <a:endParaRPr lang="en-US" dirty="0"/>
+          </a:p>
+          <a:p>
+            <a:pPr>
+              <a:buFont typeface="Arial" panose="020B0604020202020204" pitchFamily="34" charset="0"/>
+              <a:buChar char="•"/>
+            </a:pPr>
+            <a:endParaRPr lang="en-US" dirty="0"/>
+          </a:p>
+          <a:p>
+            <a:r>
+              <a:rPr lang="en-US" b="1" dirty="0"/>
+              <a:t>Pain points:</a:t>
+            </a:r>
+            <a:endParaRPr lang="en-US" dirty="0"/>
+          </a:p>
+          <a:p>
+            <a:pPr marL="285750" indent="-285750">
+              <a:buFont typeface="Arial" panose="020B0604020202020204" pitchFamily="34" charset="0"/>
+              <a:buChar char="•"/>
+            </a:pPr>
+            <a:r>
+              <a:rPr lang="en-US" dirty="0"/>
+              <a:t>Challenges with integration and corporate standards.</a:t>
+            </a:r>
+          </a:p>
+        </p:txBody>
+      </p:sp>
+      <p:sp>
+        <p:nvSpPr>
+          <p:cNvPr id="2" name="TextBox 1">
+            <a:extLst>
+              <a:ext uri="{FF2B5EF4-FFF2-40B4-BE49-F238E27FC236}">
+                <a16:creationId xmlns:a16="http://schemas.microsoft.com/office/drawing/2014/main" id="{BC8183E0-B6FC-471C-B2F8-14996330AB16}"/>
+              </a:ext>
+            </a:extLst>
+          </p:cNvPr>
+          <p:cNvSpPr txBox="1"/>
+          <p:nvPr/>
+        </p:nvSpPr>
+        <p:spPr>
+          <a:xfrm>
+            <a:off x="352043" y="903891"/>
+            <a:ext cx="4051870" cy="3539430"/>
+          </a:xfrm>
+          <a:prstGeom prst="rect">
+            <a:avLst/>
+          </a:prstGeom>
+          <a:noFill/>
+        </p:spPr>
+        <p:txBody>
+          <a:bodyPr wrap="square" rtlCol="0">
+            <a:spAutoFit/>
+          </a:bodyPr>
+          <a:lstStyle/>
+          <a:p>
+            <a:r>
+              <a:rPr lang="en-US" b="1" dirty="0"/>
+              <a:t>API Consumer (Sergey, 30 years old)</a:t>
+            </a:r>
+          </a:p>
+          <a:p>
+            <a:br>
+              <a:rPr lang="en-US" dirty="0"/>
+            </a:br>
+            <a:r>
+              <a:rPr lang="en-US" b="1" dirty="0"/>
+              <a:t>Goals:</a:t>
+            </a:r>
+            <a:endParaRPr lang="en-US" dirty="0"/>
+          </a:p>
+          <a:p>
+            <a:pPr marL="285750" indent="-285750">
+              <a:buFont typeface="Arial" panose="020B0604020202020204" pitchFamily="34" charset="0"/>
+              <a:buChar char="•"/>
+            </a:pPr>
+            <a:r>
+              <a:rPr lang="en-US" dirty="0"/>
+              <a:t>Get documentation for quick access to ML models.</a:t>
+            </a:r>
+          </a:p>
+          <a:p>
+            <a:pPr marL="285750" indent="-285750">
+              <a:buFont typeface="Arial" panose="020B0604020202020204" pitchFamily="34" charset="0"/>
+              <a:buChar char="•"/>
+            </a:pPr>
+            <a:r>
+              <a:rPr lang="en-US" dirty="0"/>
+              <a:t>Work with reliable and validated APIs.</a:t>
+            </a:r>
+            <a:endParaRPr lang="ru-RU" dirty="0"/>
+          </a:p>
+          <a:p>
+            <a:pPr>
+              <a:buFont typeface="Arial" panose="020B0604020202020204" pitchFamily="34" charset="0"/>
+              <a:buChar char="•"/>
+            </a:pPr>
+            <a:endParaRPr lang="en-US" dirty="0"/>
+          </a:p>
+          <a:p>
+            <a:pPr>
+              <a:buFont typeface="Arial" panose="020B0604020202020204" pitchFamily="34" charset="0"/>
+              <a:buChar char="•"/>
+            </a:pPr>
+            <a:endParaRPr lang="en-US" dirty="0"/>
+          </a:p>
+          <a:p>
+            <a:pPr>
+              <a:buFont typeface="Arial" panose="020B0604020202020204" pitchFamily="34" charset="0"/>
+              <a:buChar char="•"/>
+            </a:pPr>
+            <a:endParaRPr lang="en-US" dirty="0"/>
+          </a:p>
+          <a:p>
+            <a:pPr>
+              <a:buFont typeface="Arial" panose="020B0604020202020204" pitchFamily="34" charset="0"/>
+              <a:buChar char="•"/>
+            </a:pPr>
+            <a:endParaRPr lang="en-US" dirty="0"/>
+          </a:p>
+          <a:p>
+            <a:pPr>
+              <a:buFont typeface="Arial" panose="020B0604020202020204" pitchFamily="34" charset="0"/>
+              <a:buChar char="•"/>
+            </a:pPr>
+            <a:endParaRPr lang="en-US" dirty="0"/>
+          </a:p>
+          <a:p>
+            <a:endParaRPr lang="en-US" dirty="0"/>
+          </a:p>
+          <a:p>
+            <a:r>
+              <a:rPr lang="en-US" b="1" dirty="0"/>
+              <a:t>Pain points:</a:t>
+            </a:r>
+            <a:endParaRPr lang="en-US" dirty="0"/>
+          </a:p>
+          <a:p>
+            <a:pPr marL="285750" indent="-285750">
+              <a:buFont typeface="Arial" panose="020B0604020202020204" pitchFamily="34" charset="0"/>
+              <a:buChar char="•"/>
+            </a:pPr>
+            <a:r>
+              <a:rPr lang="en-US" dirty="0"/>
+              <a:t>Incomplete or outdated documentation.</a:t>
+            </a:r>
+          </a:p>
+          <a:p>
+            <a:pPr marL="285750" indent="-285750">
+              <a:buFont typeface="Arial" panose="020B0604020202020204" pitchFamily="34" charset="0"/>
+              <a:buChar char="•"/>
+            </a:pPr>
+            <a:r>
+              <a:rPr lang="en-US" dirty="0"/>
+              <a:t>API instability and delays.</a:t>
+            </a:r>
+          </a:p>
+          <a:p>
+            <a:endParaRPr lang="ru-RU" dirty="0"/>
+          </a:p>
+        </p:txBody>
+      </p:sp>
+    </p:spTree>
+    <p:extLst>
+      <p:ext uri="{BB962C8B-B14F-4D97-AF65-F5344CB8AC3E}">
+        <p14:creationId xmlns:p14="http://schemas.microsoft.com/office/powerpoint/2010/main" val="3099533355"/>
+      </p:ext>
+    </p:extLst>
+  </p:cSld>
+  <p:clrMapOvr>
+    <a:masterClrMapping/>
+  </p:clrMapOvr>
+</p:sld>
+</file>
+
+<file path=ppt/slides/slide6.xml><?xml version="1.0" encoding="utf-8"?>
 <p:sld xmlns:a="http://schemas.openxmlformats.org/drawingml/2006/main" xmlns:r="http://schemas.openxmlformats.org/officeDocument/2006/relationships" xmlns:p="http://schemas.openxmlformats.org/presentationml/2006/main">
   <p:cSld>
     <p:spTree>
@@ -6442,10 +7477,18 @@
               <a:buNone/>
             </a:pPr>
             <a:r>
-              <a:rPr lang="en-GB"/>
+              <a:rPr lang="en-GB" dirty="0">
+                <a:solidFill>
+                  <a:srgbClr val="FF0000"/>
+                </a:solidFill>
+              </a:rPr>
               <a:t>DFD (Level 0)</a:t>
             </a:r>
-            <a:endParaRPr/>
+            <a:endParaRPr dirty="0">
+              <a:solidFill>
+                <a:srgbClr val="FF0000"/>
+              </a:solidFill>
+            </a:endParaRPr>
           </a:p>
         </p:txBody>
       </p:sp>
@@ -6493,7 +7536,7 @@
 </p:sld>
 </file>
 
-<file path=ppt/slides/slide5.xml><?xml version="1.0" encoding="utf-8"?>
+<file path=ppt/slides/slide7.xml><?xml version="1.0" encoding="utf-8"?>
 <p:sld xmlns:a="http://schemas.openxmlformats.org/drawingml/2006/main" xmlns:r="http://schemas.openxmlformats.org/officeDocument/2006/relationships" xmlns:p="http://schemas.openxmlformats.org/presentationml/2006/main">
   <p:cSld>
     <p:spTree>
@@ -6545,10 +7588,18 @@
               <a:buNone/>
             </a:pPr>
             <a:r>
-              <a:rPr lang="en-GB"/>
+              <a:rPr lang="en-GB" dirty="0">
+                <a:solidFill>
+                  <a:srgbClr val="FF0000"/>
+                </a:solidFill>
+              </a:rPr>
               <a:t>Story map</a:t>
             </a:r>
-            <a:endParaRPr/>
+            <a:endParaRPr dirty="0">
+              <a:solidFill>
+                <a:srgbClr val="FF0000"/>
+              </a:solidFill>
+            </a:endParaRPr>
           </a:p>
         </p:txBody>
       </p:sp>

</xml_diff>

<commit_message>
init final task presentation
</commit_message>
<xml_diff>
--- a/Practice Tasks/Task_3/Task 3.pptx
+++ b/Practice Tasks/Task_3/Task 3.pptx
@@ -7479,14 +7479,14 @@
             <a:r>
               <a:rPr lang="en-GB" dirty="0">
                 <a:solidFill>
-                  <a:srgbClr val="FF0000"/>
+                  <a:schemeClr val="tx1"/>
                 </a:solidFill>
               </a:rPr>
               <a:t>DFD (Level 0)</a:t>
             </a:r>
             <a:endParaRPr dirty="0">
               <a:solidFill>
-                <a:srgbClr val="FF0000"/>
+                <a:schemeClr val="tx1"/>
               </a:solidFill>
             </a:endParaRPr>
           </a:p>
@@ -7589,14 +7589,14 @@
             <a:r>
               <a:rPr lang="en-GB" dirty="0">
                 <a:solidFill>
-                  <a:srgbClr val="FF0000"/>
+                  <a:schemeClr val="tx1"/>
                 </a:solidFill>
               </a:rPr>
               <a:t>Story map</a:t>
             </a:r>
             <a:endParaRPr dirty="0">
               <a:solidFill>
-                <a:srgbClr val="FF0000"/>
+                <a:schemeClr val="tx1"/>
               </a:solidFill>
             </a:endParaRPr>
           </a:p>

</xml_diff>